<commit_message>
minor edits presentaion milestone3
</commit_message>
<xml_diff>
--- a/dokumentation/Milenstein3.pptx
+++ b/dokumentation/Milenstein3.pptx
@@ -3865,7 +3865,7 @@
             <a:pPr algn="ctr"/>
             <a:r>
               <a:rPr lang="en-DE" dirty="0"/>
-              <a:t>Überblick Milenstein 3</a:t>
+              <a:t>Projektüberblick Milenstein 3</a:t>
             </a:r>
           </a:p>
         </p:txBody>
@@ -4159,8 +4159,12 @@
           <a:p>
             <a:pPr algn="ctr"/>
             <a:r>
+              <a:rPr lang="en-DE"/>
+              <a:t>Projektüberblick </a:t>
+            </a:r>
+            <a:r>
               <a:rPr lang="en-DE" dirty="0"/>
-              <a:t>Überblick Milenstein 3</a:t>
+              <a:t>Milenstein 3</a:t>
             </a:r>
           </a:p>
         </p:txBody>
@@ -4427,7 +4431,7 @@
         </p:nvSpPr>
         <p:spPr>
           <a:xfrm>
-            <a:off x="6999678" y="5707686"/>
+            <a:off x="7728284" y="5736467"/>
             <a:ext cx="3625516" cy="369332"/>
           </a:xfrm>
           <a:prstGeom prst="rect">
@@ -4443,7 +4447,7 @@
           <a:p>
             <a:r>
               <a:rPr lang="en-DE" dirty="0"/>
-              <a:t>-&gt; Bewegung des Seils </a:t>
+              <a:t>Abb.2: Bewegung des Seils </a:t>
             </a:r>
           </a:p>
         </p:txBody>
@@ -4462,7 +4466,7 @@
         </p:nvSpPr>
         <p:spPr>
           <a:xfrm>
-            <a:off x="699700" y="5707686"/>
+            <a:off x="1591389" y="5736467"/>
             <a:ext cx="3625516" cy="369332"/>
           </a:xfrm>
           <a:prstGeom prst="rect">
@@ -4478,7 +4482,7 @@
           <a:p>
             <a:r>
               <a:rPr lang="en-DE" dirty="0"/>
-              <a:t>-&gt; Correlation der Markierungen</a:t>
+              <a:t>Abb.1: Korrelation der Markierungen</a:t>
             </a:r>
           </a:p>
         </p:txBody>

</xml_diff>